<commit_message>
Add Jittor compiler fix details and PyTorch vs Jittor API comparison
- New PPT slides: compiler.py macOS ARM PMF cast fix, API migration table
- Updated report with compiler adaptation section and code diff table

Co-authored-by: Copilot <223556219+Copilot@users.noreply.github.com>
</commit_message>
<xml_diff>
--- a/LEAD_Reproduction_Report.pptx
+++ b/LEAD_Reproduction_Report.pptx
@@ -13,6 +13,8 @@
     <p:sldId id="261" r:id="rId12"/>
     <p:sldId id="262" r:id="rId13"/>
     <p:sldId id="263" r:id="rId14"/>
+    <p:sldId id="266" r:id="rId17"/>
+    <p:sldId id="267" r:id="rId18"/>
     <p:sldId id="264" r:id="rId15"/>
     <p:sldId id="265" r:id="rId16"/>
   </p:sldIdLst>
@@ -4476,6 +4478,2031 @@
             </a:pPr>
             <a:r>
               <a:t>LEAD算法有效验证</a:t>
+            </a:r>
+          </a:p>
+        </p:txBody>
+      </p:sp>
+    </p:spTree>
+  </p:cSld>
+  <p:clrMapOvr>
+    <a:masterClrMapping/>
+  </p:clrMapOvr>
+</p:sld>
+</file>
+
+<file path=ppt/slides/slide11.xml><?xml version="1.0" encoding="utf-8"?>
+<p:sld xmlns:a="http://schemas.openxmlformats.org/drawingml/2006/main" xmlns:p="http://schemas.openxmlformats.org/presentationml/2006/main" xmlns:r="http://schemas.openxmlformats.org/officeDocument/2006/relationships">
+  <p:cSld>
+    <p:bg>
+      <p:bgPr>
+        <a:solidFill>
+          <a:srgbClr val="1E1E2E"/>
+        </a:solidFill>
+        <a:effectLst/>
+      </p:bgPr>
+    </p:bg>
+    <p:spTree>
+      <p:nvGrpSpPr>
+        <p:cNvPr id="1" name=""/>
+        <p:cNvGrpSpPr/>
+        <p:nvPr/>
+      </p:nvGrpSpPr>
+      <p:grpSpPr/>
+      <p:sp>
+        <p:nvSpPr>
+          <p:cNvPr id="2" name="TextBox 1"/>
+          <p:cNvSpPr txBox="1"/>
+          <p:nvPr/>
+        </p:nvSpPr>
+        <p:spPr>
+          <a:xfrm>
+            <a:off x="457200" y="274320"/>
+            <a:ext cx="8229600" cy="365760"/>
+          </a:xfrm>
+          <a:prstGeom prst="rect">
+            <a:avLst/>
+          </a:prstGeom>
+          <a:noFill/>
+        </p:spPr>
+        <p:txBody>
+          <a:bodyPr wrap="square">
+            <a:spAutoFit/>
+          </a:bodyPr>
+          <a:lstStyle/>
+          <a:p>
+            <a:pPr>
+              <a:defRPr sz="2800" b="1">
+                <a:solidFill>
+                  <a:srgbClr val="FFFFFF"/>
+                </a:solidFill>
+              </a:defRPr>
+            </a:pPr>
+            <a:r>
+              <a:t>计图编译器适配 — macOS ARM 修复</a:t>
+            </a:r>
+          </a:p>
+        </p:txBody>
+      </p:sp>
+      <p:sp>
+        <p:nvSpPr>
+          <p:cNvPr id="3" name="TextBox 2"/>
+          <p:cNvSpPr txBox="1"/>
+          <p:nvPr/>
+        </p:nvSpPr>
+        <p:spPr>
+          <a:xfrm>
+            <a:off x="457200" y="777240"/>
+            <a:ext cx="8229600" cy="365760"/>
+          </a:xfrm>
+          <a:prstGeom prst="rect">
+            <a:avLst/>
+          </a:prstGeom>
+          <a:noFill/>
+        </p:spPr>
+        <p:txBody>
+          <a:bodyPr wrap="square">
+            <a:spAutoFit/>
+          </a:bodyPr>
+          <a:lstStyle/>
+          <a:p>
+            <a:pPr>
+              <a:defRPr sz="1500" b="0">
+                <a:solidFill>
+                  <a:srgbClr val="89B4FA"/>
+                </a:solidFill>
+              </a:defRPr>
+            </a:pPr>
+            <a:r>
+              <a:t>Jittor v1.3.10 compiler.py 底层编译代码修改（新增27行）</a:t>
+            </a:r>
+          </a:p>
+        </p:txBody>
+      </p:sp>
+      <p:sp>
+        <p:nvSpPr>
+          <p:cNvPr id="4" name="TextBox 3"/>
+          <p:cNvSpPr txBox="1"/>
+          <p:nvPr/>
+        </p:nvSpPr>
+        <p:spPr>
+          <a:xfrm>
+            <a:off x="457200" y="1188720"/>
+            <a:ext cx="8229600" cy="1828800"/>
+          </a:xfrm>
+          <a:prstGeom prst="rect">
+            <a:avLst/>
+          </a:prstGeom>
+          <a:noFill/>
+        </p:spPr>
+        <p:txBody>
+          <a:bodyPr wrap="square">
+            <a:spAutoFit/>
+          </a:bodyPr>
+          <a:lstStyle/>
+          <a:p>
+            <a:pPr>
+              <a:spcAft>
+                <a:spcPts val="300"/>
+              </a:spcAft>
+              <a:defRPr sz="1600" b="1">
+                <a:solidFill>
+                  <a:srgbClr val="F9E2AF"/>
+                </a:solidFill>
+              </a:defRPr>
+            </a:pPr>
+            <a:r>
+              <a:t>❌ 问题：macOS clang 编译 Jittor JIT 核心失败</a:t>
+            </a:r>
+          </a:p>
+          <a:p>
+            <a:pPr>
+              <a:spcAft>
+                <a:spcPts val="300"/>
+              </a:spcAft>
+              <a:defRPr sz="400" b="0">
+                <a:solidFill>
+                  <a:srgbClr val="BAC2DE"/>
+                </a:solidFill>
+              </a:defRPr>
+            </a:pPr>
+          </a:p>
+          <a:p>
+            <a:pPr>
+              <a:spcAft>
+                <a:spcPts val="300"/>
+              </a:spcAft>
+              <a:defRPr sz="1300" b="0">
+                <a:solidFill>
+                  <a:srgbClr val="BAC2DE"/>
+                </a:solidFill>
+              </a:defRPr>
+            </a:pPr>
+            <a:r>
+              <a:t>Jittor 编译 data.cc（算子注册表）时，使用了成员函数指针(PMF)强转：</a:t>
+            </a:r>
+          </a:p>
+          <a:p>
+            <a:pPr>
+              <a:spcAft>
+                <a:spcPts val="300"/>
+              </a:spcAft>
+              <a:defRPr sz="1300" b="0">
+                <a:solidFill>
+                  <a:srgbClr val="F38BA8"/>
+                </a:solidFill>
+              </a:defRPr>
+            </a:pPr>
+            <a:r>
+              <a:t>  (void(*)(Node*)) &amp;Node::forward</a:t>
+            </a:r>
+          </a:p>
+          <a:p>
+            <a:pPr>
+              <a:spcAft>
+                <a:spcPts val="300"/>
+              </a:spcAft>
+              <a:defRPr sz="1300" b="0">
+                <a:solidFill>
+                  <a:srgbClr val="BAC2DE"/>
+                </a:solidFill>
+              </a:defRPr>
+            </a:pPr>
+            <a:r>
+              <a:t>macOS ARM64 clang 严格遵循 C++ 标准，禁止 PMF→普通函数指针转换</a:t>
+            </a:r>
+          </a:p>
+          <a:p>
+            <a:pPr>
+              <a:spcAft>
+                <a:spcPts val="300"/>
+              </a:spcAft>
+              <a:defRPr sz="1300" b="0">
+                <a:solidFill>
+                  <a:srgbClr val="F38BA8"/>
+                </a:solidFill>
+              </a:defRPr>
+            </a:pPr>
+            <a:r>
+              <a:t>→ 编译直接报错，Jittor 无法在 Mac 上启动运行</a:t>
+            </a:r>
+          </a:p>
+        </p:txBody>
+      </p:sp>
+      <p:sp>
+        <p:nvSpPr>
+          <p:cNvPr id="5" name="TextBox 4"/>
+          <p:cNvSpPr txBox="1"/>
+          <p:nvPr/>
+        </p:nvSpPr>
+        <p:spPr>
+          <a:xfrm>
+            <a:off x="457200" y="3200400"/>
+            <a:ext cx="8229600" cy="2286000"/>
+          </a:xfrm>
+          <a:prstGeom prst="rect">
+            <a:avLst/>
+          </a:prstGeom>
+          <a:noFill/>
+        </p:spPr>
+        <p:txBody>
+          <a:bodyPr wrap="square">
+            <a:spAutoFit/>
+          </a:bodyPr>
+          <a:lstStyle/>
+          <a:p>
+            <a:pPr>
+              <a:spcAft>
+                <a:spcPts val="300"/>
+              </a:spcAft>
+              <a:defRPr sz="1600" b="1">
+                <a:solidFill>
+                  <a:srgbClr val="A6E3A1"/>
+                </a:solidFill>
+              </a:defRPr>
+            </a:pPr>
+            <a:r>
+              <a:t>✅ 解决方案：预处理 + 正则替换 + union 安全转换</a:t>
+            </a:r>
+          </a:p>
+          <a:p>
+            <a:pPr>
+              <a:spcAft>
+                <a:spcPts val="300"/>
+              </a:spcAft>
+              <a:defRPr sz="400" b="0">
+                <a:solidFill>
+                  <a:srgbClr val="BAC2DE"/>
+                </a:solidFill>
+              </a:defRPr>
+            </a:pPr>
+          </a:p>
+          <a:p>
+            <a:pPr>
+              <a:spcAft>
+                <a:spcPts val="300"/>
+              </a:spcAft>
+              <a:defRPr sz="1300" b="0">
+                <a:solidFill>
+                  <a:srgbClr val="BAC2DE"/>
+                </a:solidFill>
+              </a:defRPr>
+            </a:pPr>
+            <a:r>
+              <a:t>① clang -E 预处理源码 → 展开后的 .pp.cc 文件</a:t>
+            </a:r>
+          </a:p>
+          <a:p>
+            <a:pPr>
+              <a:spcAft>
+                <a:spcPts val="300"/>
+              </a:spcAft>
+              <a:defRPr sz="1300" b="0">
+                <a:solidFill>
+                  <a:srgbClr val="BAC2DE"/>
+                </a:solidFill>
+              </a:defRPr>
+            </a:pPr>
+            <a:r>
+              <a:t>② 注入 unsafe_pmf_cast&lt;To,From&gt; 模板（基于 union 类型双关）</a:t>
+            </a:r>
+          </a:p>
+          <a:p>
+            <a:pPr>
+              <a:spcAft>
+                <a:spcPts val="300"/>
+              </a:spcAft>
+              <a:defRPr sz="1300" b="0">
+                <a:solidFill>
+                  <a:srgbClr val="BAC2DE"/>
+                </a:solidFill>
+              </a:defRPr>
+            </a:pPr>
+            <a:r>
+              <a:t>③ 正则替换所有 PMF 强转为 unsafe_pmf_cast 调用：</a:t>
+            </a:r>
+          </a:p>
+          <a:p>
+            <a:pPr>
+              <a:spcAft>
+                <a:spcPts val="300"/>
+              </a:spcAft>
+              <a:defRPr sz="1200" b="0">
+                <a:solidFill>
+                  <a:srgbClr val="A6E3A1"/>
+                </a:solidFill>
+              </a:defRPr>
+            </a:pPr>
+            <a:r>
+              <a:t>   (void(*)(Node*))&amp;Node::xx → unsafe_pmf_cast&lt;void(*)(Node*)&gt;(&amp;Node::xx)</a:t>
+            </a:r>
+          </a:p>
+          <a:p>
+            <a:pPr>
+              <a:spcAft>
+                <a:spcPts val="300"/>
+              </a:spcAft>
+              <a:defRPr sz="1300" b="0">
+                <a:solidFill>
+                  <a:srgbClr val="BAC2DE"/>
+                </a:solidFill>
+              </a:defRPr>
+            </a:pPr>
+            <a:r>
+              <a:t>④ 编译修改后的预处理文件，清理临时文件</a:t>
+            </a:r>
+          </a:p>
+          <a:p>
+            <a:pPr>
+              <a:spcAft>
+                <a:spcPts val="300"/>
+              </a:spcAft>
+              <a:defRPr sz="1300" b="0">
+                <a:solidFill>
+                  <a:srgbClr val="BAC2DE"/>
+                </a:solidFill>
+              </a:defRPr>
+            </a:pPr>
+            <a:r>
+              <a:t>⑤ 仅在 platform.system()=='Darwin' 时触发，不影响 Linux</a:t>
+            </a:r>
+          </a:p>
+        </p:txBody>
+      </p:sp>
+      <p:sp>
+        <p:nvSpPr>
+          <p:cNvPr id="6" name="TextBox 5"/>
+          <p:cNvSpPr txBox="1"/>
+          <p:nvPr/>
+        </p:nvSpPr>
+        <p:spPr>
+          <a:xfrm>
+            <a:off x="457200" y="5760720"/>
+            <a:ext cx="8229600" cy="365760"/>
+          </a:xfrm>
+          <a:prstGeom prst="rect">
+            <a:avLst/>
+          </a:prstGeom>
+          <a:noFill/>
+        </p:spPr>
+        <p:txBody>
+          <a:bodyPr wrap="square">
+            <a:spAutoFit/>
+          </a:bodyPr>
+          <a:lstStyle/>
+          <a:p>
+            <a:pPr>
+              <a:defRPr sz="1100" b="0">
+                <a:solidFill>
+                  <a:srgbClr val="6C7086"/>
+                </a:solidFill>
+              </a:defRPr>
+            </a:pPr>
+            <a:r>
+              <a:t>修改文件：site-packages/jittor/compiler.py 第1363-1389行</a:t>
+            </a:r>
+          </a:p>
+        </p:txBody>
+      </p:sp>
+    </p:spTree>
+  </p:cSld>
+  <p:clrMapOvr>
+    <a:masterClrMapping/>
+  </p:clrMapOvr>
+</p:sld>
+</file>
+
+<file path=ppt/slides/slide12.xml><?xml version="1.0" encoding="utf-8"?>
+<p:sld xmlns:a="http://schemas.openxmlformats.org/drawingml/2006/main" xmlns:p="http://schemas.openxmlformats.org/presentationml/2006/main" xmlns:r="http://schemas.openxmlformats.org/officeDocument/2006/relationships">
+  <p:cSld>
+    <p:bg>
+      <p:bgPr>
+        <a:solidFill>
+          <a:srgbClr val="1E1E2E"/>
+        </a:solidFill>
+        <a:effectLst/>
+      </p:bgPr>
+    </p:bg>
+    <p:spTree>
+      <p:nvGrpSpPr>
+        <p:cNvPr id="1" name=""/>
+        <p:cNvGrpSpPr/>
+        <p:nvPr/>
+      </p:nvGrpSpPr>
+      <p:grpSpPr/>
+      <p:sp>
+        <p:nvSpPr>
+          <p:cNvPr id="2" name="TextBox 1"/>
+          <p:cNvSpPr txBox="1"/>
+          <p:nvPr/>
+        </p:nvSpPr>
+        <p:spPr>
+          <a:xfrm>
+            <a:off x="457200" y="274320"/>
+            <a:ext cx="8229600" cy="365760"/>
+          </a:xfrm>
+          <a:prstGeom prst="rect">
+            <a:avLst/>
+          </a:prstGeom>
+          <a:noFill/>
+        </p:spPr>
+        <p:txBody>
+          <a:bodyPr wrap="square">
+            <a:spAutoFit/>
+          </a:bodyPr>
+          <a:lstStyle/>
+          <a:p>
+            <a:pPr>
+              <a:defRPr sz="2800" b="1">
+                <a:solidFill>
+                  <a:srgbClr val="FFFFFF"/>
+                </a:solidFill>
+              </a:defRPr>
+            </a:pPr>
+            <a:r>
+              <a:t>PyTorch vs 计图 — 代码移植对比</a:t>
+            </a:r>
+          </a:p>
+        </p:txBody>
+      </p:sp>
+      <p:sp>
+        <p:nvSpPr>
+          <p:cNvPr id="3" name="TextBox 2"/>
+          <p:cNvSpPr txBox="1"/>
+          <p:nvPr/>
+        </p:nvSpPr>
+        <p:spPr>
+          <a:xfrm>
+            <a:off x="457200" y="777240"/>
+            <a:ext cx="8229600" cy="365760"/>
+          </a:xfrm>
+          <a:prstGeom prst="rect">
+            <a:avLst/>
+          </a:prstGeom>
+          <a:noFill/>
+        </p:spPr>
+        <p:txBody>
+          <a:bodyPr wrap="square">
+            <a:spAutoFit/>
+          </a:bodyPr>
+          <a:lstStyle/>
+          <a:p>
+            <a:pPr>
+              <a:defRPr sz="1500" b="0">
+                <a:solidFill>
+                  <a:srgbClr val="89B4FA"/>
+                </a:solidFill>
+              </a:defRPr>
+            </a:pPr>
+            <a:r>
+              <a:t>从 PyTorch 移植到 Jittor 的关键 API 差异与适配方案</a:t>
+            </a:r>
+          </a:p>
+        </p:txBody>
+      </p:sp>
+      <p:sp>
+        <p:nvSpPr>
+          <p:cNvPr id="4" name="TextBox 3"/>
+          <p:cNvSpPr txBox="1"/>
+          <p:nvPr/>
+        </p:nvSpPr>
+        <p:spPr>
+          <a:xfrm>
+            <a:off x="182880" y="1051560"/>
+            <a:ext cx="1371600" cy="365760"/>
+          </a:xfrm>
+          <a:prstGeom prst="rect">
+            <a:avLst/>
+          </a:prstGeom>
+          <a:noFill/>
+        </p:spPr>
+        <p:txBody>
+          <a:bodyPr wrap="square">
+            <a:spAutoFit/>
+          </a:bodyPr>
+          <a:lstStyle/>
+          <a:p>
+            <a:pPr>
+              <a:defRPr sz="1100" b="1">
+                <a:solidFill>
+                  <a:srgbClr val="FFFFFF"/>
+                </a:solidFill>
+              </a:defRPr>
+            </a:pPr>
+            <a:r>
+              <a:t>改动项</a:t>
+            </a:r>
+          </a:p>
+        </p:txBody>
+      </p:sp>
+      <p:sp>
+        <p:nvSpPr>
+          <p:cNvPr id="5" name="TextBox 4"/>
+          <p:cNvSpPr txBox="1"/>
+          <p:nvPr/>
+        </p:nvSpPr>
+        <p:spPr>
+          <a:xfrm>
+            <a:off x="1554480" y="1051560"/>
+            <a:ext cx="2468880" cy="365760"/>
+          </a:xfrm>
+          <a:prstGeom prst="rect">
+            <a:avLst/>
+          </a:prstGeom>
+          <a:noFill/>
+        </p:spPr>
+        <p:txBody>
+          <a:bodyPr wrap="square">
+            <a:spAutoFit/>
+          </a:bodyPr>
+          <a:lstStyle/>
+          <a:p>
+            <a:pPr>
+              <a:defRPr sz="1100" b="1">
+                <a:solidFill>
+                  <a:srgbClr val="F38BA8"/>
+                </a:solidFill>
+              </a:defRPr>
+            </a:pPr>
+            <a:r>
+              <a:t>PyTorch 原始写法</a:t>
+            </a:r>
+          </a:p>
+        </p:txBody>
+      </p:sp>
+      <p:sp>
+        <p:nvSpPr>
+          <p:cNvPr id="6" name="TextBox 5"/>
+          <p:cNvSpPr txBox="1"/>
+          <p:nvPr/>
+        </p:nvSpPr>
+        <p:spPr>
+          <a:xfrm>
+            <a:off x="4206240" y="1051560"/>
+            <a:ext cx="2468880" cy="365760"/>
+          </a:xfrm>
+          <a:prstGeom prst="rect">
+            <a:avLst/>
+          </a:prstGeom>
+          <a:noFill/>
+        </p:spPr>
+        <p:txBody>
+          <a:bodyPr wrap="square">
+            <a:spAutoFit/>
+          </a:bodyPr>
+          <a:lstStyle/>
+          <a:p>
+            <a:pPr>
+              <a:defRPr sz="1100" b="1">
+                <a:solidFill>
+                  <a:srgbClr val="A6E3A1"/>
+                </a:solidFill>
+              </a:defRPr>
+            </a:pPr>
+            <a:r>
+              <a:t>Jittor 适配写法</a:t>
+            </a:r>
+          </a:p>
+        </p:txBody>
+      </p:sp>
+      <p:sp>
+        <p:nvSpPr>
+          <p:cNvPr id="7" name="TextBox 6"/>
+          <p:cNvSpPr txBox="1"/>
+          <p:nvPr/>
+        </p:nvSpPr>
+        <p:spPr>
+          <a:xfrm>
+            <a:off x="6858000" y="1051560"/>
+            <a:ext cx="2194560" cy="365760"/>
+          </a:xfrm>
+          <a:prstGeom prst="rect">
+            <a:avLst/>
+          </a:prstGeom>
+          <a:noFill/>
+        </p:spPr>
+        <p:txBody>
+          <a:bodyPr wrap="square">
+            <a:spAutoFit/>
+          </a:bodyPr>
+          <a:lstStyle/>
+          <a:p>
+            <a:pPr>
+              <a:defRPr sz="1100" b="1">
+                <a:solidFill>
+                  <a:srgbClr val="FFFFFF"/>
+                </a:solidFill>
+              </a:defRPr>
+            </a:pPr>
+            <a:r>
+              <a:t>说明</a:t>
+            </a:r>
+          </a:p>
+        </p:txBody>
+      </p:sp>
+      <p:sp>
+        <p:nvSpPr>
+          <p:cNvPr id="8" name="TextBox 7"/>
+          <p:cNvSpPr txBox="1"/>
+          <p:nvPr/>
+        </p:nvSpPr>
+        <p:spPr>
+          <a:xfrm>
+            <a:off x="182880" y="1371600"/>
+            <a:ext cx="1371600" cy="365760"/>
+          </a:xfrm>
+          <a:prstGeom prst="rect">
+            <a:avLst/>
+          </a:prstGeom>
+          <a:noFill/>
+        </p:spPr>
+        <p:txBody>
+          <a:bodyPr wrap="square">
+            <a:spAutoFit/>
+          </a:bodyPr>
+          <a:lstStyle/>
+          <a:p>
+            <a:pPr>
+              <a:defRPr sz="1000" b="1">
+                <a:solidFill>
+                  <a:srgbClr val="F9E2AF"/>
+                </a:solidFill>
+              </a:defRPr>
+            </a:pPr>
+            <a:r>
+              <a:t>模型前向传播</a:t>
+            </a:r>
+          </a:p>
+        </p:txBody>
+      </p:sp>
+      <p:sp>
+        <p:nvSpPr>
+          <p:cNvPr id="9" name="TextBox 8"/>
+          <p:cNvSpPr txBox="1"/>
+          <p:nvPr/>
+        </p:nvSpPr>
+        <p:spPr>
+          <a:xfrm>
+            <a:off x="1554480" y="1371600"/>
+            <a:ext cx="2468880" cy="365760"/>
+          </a:xfrm>
+          <a:prstGeom prst="rect">
+            <a:avLst/>
+          </a:prstGeom>
+          <a:noFill/>
+        </p:spPr>
+        <p:txBody>
+          <a:bodyPr wrap="square">
+            <a:spAutoFit/>
+          </a:bodyPr>
+          <a:lstStyle/>
+          <a:p>
+            <a:pPr>
+              <a:defRPr sz="1000" b="0">
+                <a:solidFill>
+                  <a:srgbClr val="F38BA8"/>
+                </a:solidFill>
+              </a:defRPr>
+            </a:pPr>
+            <a:r>
+              <a:t>forward(self, x)</a:t>
+            </a:r>
+          </a:p>
+        </p:txBody>
+      </p:sp>
+      <p:sp>
+        <p:nvSpPr>
+          <p:cNvPr id="10" name="TextBox 9"/>
+          <p:cNvSpPr txBox="1"/>
+          <p:nvPr/>
+        </p:nvSpPr>
+        <p:spPr>
+          <a:xfrm>
+            <a:off x="4206240" y="1371600"/>
+            <a:ext cx="2468880" cy="365760"/>
+          </a:xfrm>
+          <a:prstGeom prst="rect">
+            <a:avLst/>
+          </a:prstGeom>
+          <a:noFill/>
+        </p:spPr>
+        <p:txBody>
+          <a:bodyPr wrap="square">
+            <a:spAutoFit/>
+          </a:bodyPr>
+          <a:lstStyle/>
+          <a:p>
+            <a:pPr>
+              <a:defRPr sz="1000" b="0">
+                <a:solidFill>
+                  <a:srgbClr val="A6E3A1"/>
+                </a:solidFill>
+              </a:defRPr>
+            </a:pPr>
+            <a:r>
+              <a:t>execute(self, x)</a:t>
+            </a:r>
+          </a:p>
+        </p:txBody>
+      </p:sp>
+      <p:sp>
+        <p:nvSpPr>
+          <p:cNvPr id="11" name="TextBox 10"/>
+          <p:cNvSpPr txBox="1"/>
+          <p:nvPr/>
+        </p:nvSpPr>
+        <p:spPr>
+          <a:xfrm>
+            <a:off x="6858000" y="1371600"/>
+            <a:ext cx="2194560" cy="365760"/>
+          </a:xfrm>
+          <a:prstGeom prst="rect">
+            <a:avLst/>
+          </a:prstGeom>
+          <a:noFill/>
+        </p:spPr>
+        <p:txBody>
+          <a:bodyPr wrap="square">
+            <a:spAutoFit/>
+          </a:bodyPr>
+          <a:lstStyle/>
+          <a:p>
+            <a:pPr>
+              <a:defRPr sz="900" b="0">
+                <a:solidFill>
+                  <a:srgbClr val="6C7086"/>
+                </a:solidFill>
+              </a:defRPr>
+            </a:pPr>
+            <a:r>
+              <a:t>Jittor 约定</a:t>
+            </a:r>
+          </a:p>
+        </p:txBody>
+      </p:sp>
+      <p:sp>
+        <p:nvSpPr>
+          <p:cNvPr id="12" name="TextBox 11"/>
+          <p:cNvSpPr txBox="1"/>
+          <p:nvPr/>
+        </p:nvSpPr>
+        <p:spPr>
+          <a:xfrm>
+            <a:off x="182880" y="1755648"/>
+            <a:ext cx="1371600" cy="365760"/>
+          </a:xfrm>
+          <a:prstGeom prst="rect">
+            <a:avLst/>
+          </a:prstGeom>
+          <a:noFill/>
+        </p:spPr>
+        <p:txBody>
+          <a:bodyPr wrap="square">
+            <a:spAutoFit/>
+          </a:bodyPr>
+          <a:lstStyle/>
+          <a:p>
+            <a:pPr>
+              <a:defRPr sz="1000" b="1">
+                <a:solidFill>
+                  <a:srgbClr val="F9E2AF"/>
+                </a:solidFill>
+              </a:defRPr>
+            </a:pPr>
+            <a:r>
+              <a:t>权重归一化</a:t>
+            </a:r>
+          </a:p>
+        </p:txBody>
+      </p:sp>
+      <p:sp>
+        <p:nvSpPr>
+          <p:cNvPr id="13" name="TextBox 12"/>
+          <p:cNvSpPr txBox="1"/>
+          <p:nvPr/>
+        </p:nvSpPr>
+        <p:spPr>
+          <a:xfrm>
+            <a:off x="1554480" y="1755648"/>
+            <a:ext cx="2468880" cy="365760"/>
+          </a:xfrm>
+          <a:prstGeom prst="rect">
+            <a:avLst/>
+          </a:prstGeom>
+          <a:noFill/>
+        </p:spPr>
+        <p:txBody>
+          <a:bodyPr wrap="square">
+            <a:spAutoFit/>
+          </a:bodyPr>
+          <a:lstStyle/>
+          <a:p>
+            <a:pPr>
+              <a:defRPr sz="1000" b="0">
+                <a:solidFill>
+                  <a:srgbClr val="F38BA8"/>
+                </a:solidFill>
+              </a:defRPr>
+            </a:pPr>
+            <a:r>
+              <a:t>nn.utils.weight_norm()</a:t>
+            </a:r>
+          </a:p>
+        </p:txBody>
+      </p:sp>
+      <p:sp>
+        <p:nvSpPr>
+          <p:cNvPr id="14" name="TextBox 13"/>
+          <p:cNvSpPr txBox="1"/>
+          <p:nvPr/>
+        </p:nvSpPr>
+        <p:spPr>
+          <a:xfrm>
+            <a:off x="4206240" y="1755648"/>
+            <a:ext cx="2468880" cy="365760"/>
+          </a:xfrm>
+          <a:prstGeom prst="rect">
+            <a:avLst/>
+          </a:prstGeom>
+          <a:noFill/>
+        </p:spPr>
+        <p:txBody>
+          <a:bodyPr wrap="square">
+            <a:spAutoFit/>
+          </a:bodyPr>
+          <a:lstStyle/>
+          <a:p>
+            <a:pPr>
+              <a:defRPr sz="1000" b="0">
+                <a:solidFill>
+                  <a:srgbClr val="A6E3A1"/>
+                </a:solidFill>
+              </a:defRPr>
+            </a:pPr>
+            <a:r>
+              <a:t>手写 WeightNormLinear</a:t>
+            </a:r>
+          </a:p>
+        </p:txBody>
+      </p:sp>
+      <p:sp>
+        <p:nvSpPr>
+          <p:cNvPr id="15" name="TextBox 14"/>
+          <p:cNvSpPr txBox="1"/>
+          <p:nvPr/>
+        </p:nvSpPr>
+        <p:spPr>
+          <a:xfrm>
+            <a:off x="6858000" y="1755648"/>
+            <a:ext cx="2194560" cy="365760"/>
+          </a:xfrm>
+          <a:prstGeom prst="rect">
+            <a:avLst/>
+          </a:prstGeom>
+          <a:noFill/>
+        </p:spPr>
+        <p:txBody>
+          <a:bodyPr wrap="square">
+            <a:spAutoFit/>
+          </a:bodyPr>
+          <a:lstStyle/>
+          <a:p>
+            <a:pPr>
+              <a:defRPr sz="900" b="0">
+                <a:solidFill>
+                  <a:srgbClr val="6C7086"/>
+                </a:solidFill>
+              </a:defRPr>
+            </a:pPr>
+            <a:r>
+              <a:t>Jittor 无内置，手动 g·v/‖v‖</a:t>
+            </a:r>
+          </a:p>
+        </p:txBody>
+      </p:sp>
+      <p:sp>
+        <p:nvSpPr>
+          <p:cNvPr id="16" name="TextBox 15"/>
+          <p:cNvSpPr txBox="1"/>
+          <p:nvPr/>
+        </p:nvSpPr>
+        <p:spPr>
+          <a:xfrm>
+            <a:off x="182880" y="2139696"/>
+            <a:ext cx="1371600" cy="365760"/>
+          </a:xfrm>
+          <a:prstGeom prst="rect">
+            <a:avLst/>
+          </a:prstGeom>
+          <a:noFill/>
+        </p:spPr>
+        <p:txBody>
+          <a:bodyPr wrap="square">
+            <a:spAutoFit/>
+          </a:bodyPr>
+          <a:lstStyle/>
+          <a:p>
+            <a:pPr>
+              <a:defRPr sz="1000" b="1">
+                <a:solidFill>
+                  <a:srgbClr val="F9E2AF"/>
+                </a:solidFill>
+              </a:defRPr>
+            </a:pPr>
+            <a:r>
+              <a:t>线性层计算</a:t>
+            </a:r>
+          </a:p>
+        </p:txBody>
+      </p:sp>
+      <p:sp>
+        <p:nvSpPr>
+          <p:cNvPr id="17" name="TextBox 16"/>
+          <p:cNvSpPr txBox="1"/>
+          <p:nvPr/>
+        </p:nvSpPr>
+        <p:spPr>
+          <a:xfrm>
+            <a:off x="1554480" y="2139696"/>
+            <a:ext cx="2468880" cy="365760"/>
+          </a:xfrm>
+          <a:prstGeom prst="rect">
+            <a:avLst/>
+          </a:prstGeom>
+          <a:noFill/>
+        </p:spPr>
+        <p:txBody>
+          <a:bodyPr wrap="square">
+            <a:spAutoFit/>
+          </a:bodyPr>
+          <a:lstStyle/>
+          <a:p>
+            <a:pPr>
+              <a:defRPr sz="1000" b="0">
+                <a:solidFill>
+                  <a:srgbClr val="F38BA8"/>
+                </a:solidFill>
+              </a:defRPr>
+            </a:pPr>
+            <a:r>
+              <a:t>F.linear(x, w, b)</a:t>
+            </a:r>
+          </a:p>
+        </p:txBody>
+      </p:sp>
+      <p:sp>
+        <p:nvSpPr>
+          <p:cNvPr id="18" name="TextBox 17"/>
+          <p:cNvSpPr txBox="1"/>
+          <p:nvPr/>
+        </p:nvSpPr>
+        <p:spPr>
+          <a:xfrm>
+            <a:off x="4206240" y="2139696"/>
+            <a:ext cx="2468880" cy="365760"/>
+          </a:xfrm>
+          <a:prstGeom prst="rect">
+            <a:avLst/>
+          </a:prstGeom>
+          <a:noFill/>
+        </p:spPr>
+        <p:txBody>
+          <a:bodyPr wrap="square">
+            <a:spAutoFit/>
+          </a:bodyPr>
+          <a:lstStyle/>
+          <a:p>
+            <a:pPr>
+              <a:defRPr sz="1000" b="0">
+                <a:solidFill>
+                  <a:srgbClr val="A6E3A1"/>
+                </a:solidFill>
+              </a:defRPr>
+            </a:pPr>
+            <a:r>
+              <a:t>matmul_transpose(x,w)+b</a:t>
+            </a:r>
+          </a:p>
+        </p:txBody>
+      </p:sp>
+      <p:sp>
+        <p:nvSpPr>
+          <p:cNvPr id="19" name="TextBox 18"/>
+          <p:cNvSpPr txBox="1"/>
+          <p:nvPr/>
+        </p:nvSpPr>
+        <p:spPr>
+          <a:xfrm>
+            <a:off x="6858000" y="2139696"/>
+            <a:ext cx="2194560" cy="365760"/>
+          </a:xfrm>
+          <a:prstGeom prst="rect">
+            <a:avLst/>
+          </a:prstGeom>
+          <a:noFill/>
+        </p:spPr>
+        <p:txBody>
+          <a:bodyPr wrap="square">
+            <a:spAutoFit/>
+          </a:bodyPr>
+          <a:lstStyle/>
+          <a:p>
+            <a:pPr>
+              <a:defRPr sz="900" b="0">
+                <a:solidFill>
+                  <a:srgbClr val="6C7086"/>
+                </a:solidFill>
+              </a:defRPr>
+            </a:pPr>
+            <a:r>
+              <a:t>矩阵转置乘法替代</a:t>
+            </a:r>
+          </a:p>
+        </p:txBody>
+      </p:sp>
+      <p:sp>
+        <p:nvSpPr>
+          <p:cNvPr id="20" name="TextBox 19"/>
+          <p:cNvSpPr txBox="1"/>
+          <p:nvPr/>
+        </p:nvSpPr>
+        <p:spPr>
+          <a:xfrm>
+            <a:off x="182880" y="2523744"/>
+            <a:ext cx="1371600" cy="365760"/>
+          </a:xfrm>
+          <a:prstGeom prst="rect">
+            <a:avLst/>
+          </a:prstGeom>
+          <a:noFill/>
+        </p:spPr>
+        <p:txBody>
+          <a:bodyPr wrap="square">
+            <a:spAutoFit/>
+          </a:bodyPr>
+          <a:lstStyle/>
+          <a:p>
+            <a:pPr>
+              <a:defRPr sz="1000" b="1">
+                <a:solidFill>
+                  <a:srgbClr val="F9E2AF"/>
+                </a:solidFill>
+              </a:defRPr>
+            </a:pPr>
+            <a:r>
+              <a:t>反向传播</a:t>
+            </a:r>
+          </a:p>
+        </p:txBody>
+      </p:sp>
+      <p:sp>
+        <p:nvSpPr>
+          <p:cNvPr id="21" name="TextBox 20"/>
+          <p:cNvSpPr txBox="1"/>
+          <p:nvPr/>
+        </p:nvSpPr>
+        <p:spPr>
+          <a:xfrm>
+            <a:off x="1554480" y="2523744"/>
+            <a:ext cx="2468880" cy="365760"/>
+          </a:xfrm>
+          <a:prstGeom prst="rect">
+            <a:avLst/>
+          </a:prstGeom>
+          <a:noFill/>
+        </p:spPr>
+        <p:txBody>
+          <a:bodyPr wrap="square">
+            <a:spAutoFit/>
+          </a:bodyPr>
+          <a:lstStyle/>
+          <a:p>
+            <a:pPr>
+              <a:defRPr sz="1000" b="0">
+                <a:solidFill>
+                  <a:srgbClr val="F38BA8"/>
+                </a:solidFill>
+              </a:defRPr>
+            </a:pPr>
+            <a:r>
+              <a:t>loss.backward()</a:t>
+            </a:r>
+            <a:br/>
+            <a:r>
+              <a:t>optimizer.step()</a:t>
+            </a:r>
+          </a:p>
+        </p:txBody>
+      </p:sp>
+      <p:sp>
+        <p:nvSpPr>
+          <p:cNvPr id="22" name="TextBox 21"/>
+          <p:cNvSpPr txBox="1"/>
+          <p:nvPr/>
+        </p:nvSpPr>
+        <p:spPr>
+          <a:xfrm>
+            <a:off x="4206240" y="2523744"/>
+            <a:ext cx="2468880" cy="365760"/>
+          </a:xfrm>
+          <a:prstGeom prst="rect">
+            <a:avLst/>
+          </a:prstGeom>
+          <a:noFill/>
+        </p:spPr>
+        <p:txBody>
+          <a:bodyPr wrap="square">
+            <a:spAutoFit/>
+          </a:bodyPr>
+          <a:lstStyle/>
+          <a:p>
+            <a:pPr>
+              <a:defRPr sz="1000" b="0">
+                <a:solidFill>
+                  <a:srgbClr val="A6E3A1"/>
+                </a:solidFill>
+              </a:defRPr>
+            </a:pPr>
+            <a:r>
+              <a:t>optimizer.step(loss)</a:t>
+            </a:r>
+          </a:p>
+        </p:txBody>
+      </p:sp>
+      <p:sp>
+        <p:nvSpPr>
+          <p:cNvPr id="23" name="TextBox 22"/>
+          <p:cNvSpPr txBox="1"/>
+          <p:nvPr/>
+        </p:nvSpPr>
+        <p:spPr>
+          <a:xfrm>
+            <a:off x="6858000" y="2523744"/>
+            <a:ext cx="2194560" cy="365760"/>
+          </a:xfrm>
+          <a:prstGeom prst="rect">
+            <a:avLst/>
+          </a:prstGeom>
+          <a:noFill/>
+        </p:spPr>
+        <p:txBody>
+          <a:bodyPr wrap="square">
+            <a:spAutoFit/>
+          </a:bodyPr>
+          <a:lstStyle/>
+          <a:p>
+            <a:pPr>
+              <a:defRPr sz="900" b="0">
+                <a:solidFill>
+                  <a:srgbClr val="6C7086"/>
+                </a:solidFill>
+              </a:defRPr>
+            </a:pPr>
+            <a:r>
+              <a:t>一步完成自动微分</a:t>
+            </a:r>
+          </a:p>
+        </p:txBody>
+      </p:sp>
+      <p:sp>
+        <p:nvSpPr>
+          <p:cNvPr id="24" name="TextBox 23"/>
+          <p:cNvSpPr txBox="1"/>
+          <p:nvPr/>
+        </p:nvSpPr>
+        <p:spPr>
+          <a:xfrm>
+            <a:off x="182880" y="2907792"/>
+            <a:ext cx="1371600" cy="365760"/>
+          </a:xfrm>
+          <a:prstGeom prst="rect">
+            <a:avLst/>
+          </a:prstGeom>
+          <a:noFill/>
+        </p:spPr>
+        <p:txBody>
+          <a:bodyPr wrap="square">
+            <a:spAutoFit/>
+          </a:bodyPr>
+          <a:lstStyle/>
+          <a:p>
+            <a:pPr>
+              <a:defRPr sz="1000" b="1">
+                <a:solidFill>
+                  <a:srgbClr val="F9E2AF"/>
+                </a:solidFill>
+              </a:defRPr>
+            </a:pPr>
+            <a:r>
+              <a:t>冻结参数</a:t>
+            </a:r>
+          </a:p>
+        </p:txBody>
+      </p:sp>
+      <p:sp>
+        <p:nvSpPr>
+          <p:cNvPr id="25" name="TextBox 24"/>
+          <p:cNvSpPr txBox="1"/>
+          <p:nvPr/>
+        </p:nvSpPr>
+        <p:spPr>
+          <a:xfrm>
+            <a:off x="1554480" y="2907792"/>
+            <a:ext cx="2468880" cy="365760"/>
+          </a:xfrm>
+          <a:prstGeom prst="rect">
+            <a:avLst/>
+          </a:prstGeom>
+          <a:noFill/>
+        </p:spPr>
+        <p:txBody>
+          <a:bodyPr wrap="square">
+            <a:spAutoFit/>
+          </a:bodyPr>
+          <a:lstStyle/>
+          <a:p>
+            <a:pPr>
+              <a:defRPr sz="1000" b="0">
+                <a:solidFill>
+                  <a:srgbClr val="F38BA8"/>
+                </a:solidFill>
+              </a:defRPr>
+            </a:pPr>
+            <a:r>
+              <a:t>requires_grad_(False)</a:t>
+            </a:r>
+          </a:p>
+        </p:txBody>
+      </p:sp>
+      <p:sp>
+        <p:nvSpPr>
+          <p:cNvPr id="26" name="TextBox 25"/>
+          <p:cNvSpPr txBox="1"/>
+          <p:nvPr/>
+        </p:nvSpPr>
+        <p:spPr>
+          <a:xfrm>
+            <a:off x="4206240" y="2907792"/>
+            <a:ext cx="2468880" cy="365760"/>
+          </a:xfrm>
+          <a:prstGeom prst="rect">
+            <a:avLst/>
+          </a:prstGeom>
+          <a:noFill/>
+        </p:spPr>
+        <p:txBody>
+          <a:bodyPr wrap="square">
+            <a:spAutoFit/>
+          </a:bodyPr>
+          <a:lstStyle/>
+          <a:p>
+            <a:pPr>
+              <a:defRPr sz="1000" b="0">
+                <a:solidFill>
+                  <a:srgbClr val="A6E3A1"/>
+                </a:solidFill>
+              </a:defRPr>
+            </a:pPr>
+            <a:r>
+              <a:t>v.stop_grad()</a:t>
+            </a:r>
+          </a:p>
+        </p:txBody>
+      </p:sp>
+      <p:sp>
+        <p:nvSpPr>
+          <p:cNvPr id="27" name="TextBox 26"/>
+          <p:cNvSpPr txBox="1"/>
+          <p:nvPr/>
+        </p:nvSpPr>
+        <p:spPr>
+          <a:xfrm>
+            <a:off x="6858000" y="2907792"/>
+            <a:ext cx="2194560" cy="365760"/>
+          </a:xfrm>
+          <a:prstGeom prst="rect">
+            <a:avLst/>
+          </a:prstGeom>
+          <a:noFill/>
+        </p:spPr>
+        <p:txBody>
+          <a:bodyPr wrap="square">
+            <a:spAutoFit/>
+          </a:bodyPr>
+          <a:lstStyle/>
+          <a:p>
+            <a:pPr>
+              <a:defRPr sz="900" b="0">
+                <a:solidFill>
+                  <a:srgbClr val="6C7086"/>
+                </a:solidFill>
+              </a:defRPr>
+            </a:pPr>
+            <a:r>
+              <a:t>梯度阻断方式不同</a:t>
+            </a:r>
+          </a:p>
+        </p:txBody>
+      </p:sp>
+      <p:sp>
+        <p:nvSpPr>
+          <p:cNvPr id="28" name="TextBox 27"/>
+          <p:cNvSpPr txBox="1"/>
+          <p:nvPr/>
+        </p:nvSpPr>
+        <p:spPr>
+          <a:xfrm>
+            <a:off x="182880" y="3291840"/>
+            <a:ext cx="1371600" cy="365760"/>
+          </a:xfrm>
+          <a:prstGeom prst="rect">
+            <a:avLst/>
+          </a:prstGeom>
+          <a:noFill/>
+        </p:spPr>
+        <p:txBody>
+          <a:bodyPr wrap="square">
+            <a:spAutoFit/>
+          </a:bodyPr>
+          <a:lstStyle/>
+          <a:p>
+            <a:pPr>
+              <a:defRPr sz="1000" b="1">
+                <a:solidFill>
+                  <a:srgbClr val="F9E2AF"/>
+                </a:solidFill>
+              </a:defRPr>
+            </a:pPr>
+            <a:r>
+              <a:t>数据集</a:t>
+            </a:r>
+          </a:p>
+        </p:txBody>
+      </p:sp>
+      <p:sp>
+        <p:nvSpPr>
+          <p:cNvPr id="29" name="TextBox 28"/>
+          <p:cNvSpPr txBox="1"/>
+          <p:nvPr/>
+        </p:nvSpPr>
+        <p:spPr>
+          <a:xfrm>
+            <a:off x="1554480" y="3291840"/>
+            <a:ext cx="2468880" cy="365760"/>
+          </a:xfrm>
+          <a:prstGeom prst="rect">
+            <a:avLst/>
+          </a:prstGeom>
+          <a:noFill/>
+        </p:spPr>
+        <p:txBody>
+          <a:bodyPr wrap="square">
+            <a:spAutoFit/>
+          </a:bodyPr>
+          <a:lstStyle/>
+          <a:p>
+            <a:pPr>
+              <a:defRPr sz="1000" b="0">
+                <a:solidFill>
+                  <a:srgbClr val="F38BA8"/>
+                </a:solidFill>
+              </a:defRPr>
+            </a:pPr>
+            <a:r>
+              <a:t>torch.utils.data.Dataset</a:t>
+            </a:r>
+          </a:p>
+        </p:txBody>
+      </p:sp>
+      <p:sp>
+        <p:nvSpPr>
+          <p:cNvPr id="30" name="TextBox 29"/>
+          <p:cNvSpPr txBox="1"/>
+          <p:nvPr/>
+        </p:nvSpPr>
+        <p:spPr>
+          <a:xfrm>
+            <a:off x="4206240" y="3291840"/>
+            <a:ext cx="2468880" cy="365760"/>
+          </a:xfrm>
+          <a:prstGeom prst="rect">
+            <a:avLst/>
+          </a:prstGeom>
+          <a:noFill/>
+        </p:spPr>
+        <p:txBody>
+          <a:bodyPr wrap="square">
+            <a:spAutoFit/>
+          </a:bodyPr>
+          <a:lstStyle/>
+          <a:p>
+            <a:pPr>
+              <a:defRPr sz="1000" b="0">
+                <a:solidFill>
+                  <a:srgbClr val="A6E3A1"/>
+                </a:solidFill>
+              </a:defRPr>
+            </a:pPr>
+            <a:r>
+              <a:t>jt.dataset.Dataset</a:t>
+            </a:r>
+            <a:br/>
+            <a:r>
+              <a:t>+ set_attrs()</a:t>
+            </a:r>
+          </a:p>
+        </p:txBody>
+      </p:sp>
+      <p:sp>
+        <p:nvSpPr>
+          <p:cNvPr id="31" name="TextBox 30"/>
+          <p:cNvSpPr txBox="1"/>
+          <p:nvPr/>
+        </p:nvSpPr>
+        <p:spPr>
+          <a:xfrm>
+            <a:off x="6858000" y="3291840"/>
+            <a:ext cx="2194560" cy="365760"/>
+          </a:xfrm>
+          <a:prstGeom prst="rect">
+            <a:avLst/>
+          </a:prstGeom>
+          <a:noFill/>
+        </p:spPr>
+        <p:txBody>
+          <a:bodyPr wrap="square">
+            <a:spAutoFit/>
+          </a:bodyPr>
+          <a:lstStyle/>
+          <a:p>
+            <a:pPr>
+              <a:defRPr sz="900" b="0">
+                <a:solidFill>
+                  <a:srgbClr val="6C7086"/>
+                </a:solidFill>
+              </a:defRPr>
+            </a:pPr>
+            <a:r>
+              <a:t>内置 DataLoader 功能</a:t>
+            </a:r>
+          </a:p>
+        </p:txBody>
+      </p:sp>
+      <p:sp>
+        <p:nvSpPr>
+          <p:cNvPr id="32" name="TextBox 31"/>
+          <p:cNvSpPr txBox="1"/>
+          <p:nvPr/>
+        </p:nvSpPr>
+        <p:spPr>
+          <a:xfrm>
+            <a:off x="182880" y="3675888"/>
+            <a:ext cx="1371600" cy="365760"/>
+          </a:xfrm>
+          <a:prstGeom prst="rect">
+            <a:avLst/>
+          </a:prstGeom>
+          <a:noFill/>
+        </p:spPr>
+        <p:txBody>
+          <a:bodyPr wrap="square">
+            <a:spAutoFit/>
+          </a:bodyPr>
+          <a:lstStyle/>
+          <a:p>
+            <a:pPr>
+              <a:defRPr sz="1000" b="1">
+                <a:solidFill>
+                  <a:srgbClr val="F9E2AF"/>
+                </a:solidFill>
+              </a:defRPr>
+            </a:pPr>
+            <a:r>
+              <a:t>图像归一化</a:t>
+            </a:r>
+          </a:p>
+        </p:txBody>
+      </p:sp>
+      <p:sp>
+        <p:nvSpPr>
+          <p:cNvPr id="33" name="TextBox 32"/>
+          <p:cNvSpPr txBox="1"/>
+          <p:nvPr/>
+        </p:nvSpPr>
+        <p:spPr>
+          <a:xfrm>
+            <a:off x="1554480" y="3675888"/>
+            <a:ext cx="2468880" cy="365760"/>
+          </a:xfrm>
+          <a:prstGeom prst="rect">
+            <a:avLst/>
+          </a:prstGeom>
+          <a:noFill/>
+        </p:spPr>
+        <p:txBody>
+          <a:bodyPr wrap="square">
+            <a:spAutoFit/>
+          </a:bodyPr>
+          <a:lstStyle/>
+          <a:p>
+            <a:pPr>
+              <a:defRPr sz="1000" b="0">
+                <a:solidFill>
+                  <a:srgbClr val="F38BA8"/>
+                </a:solidFill>
+              </a:defRPr>
+            </a:pPr>
+            <a:r>
+              <a:t>transforms.Normalize()</a:t>
+            </a:r>
+          </a:p>
+        </p:txBody>
+      </p:sp>
+      <p:sp>
+        <p:nvSpPr>
+          <p:cNvPr id="34" name="TextBox 33"/>
+          <p:cNvSpPr txBox="1"/>
+          <p:nvPr/>
+        </p:nvSpPr>
+        <p:spPr>
+          <a:xfrm>
+            <a:off x="4206240" y="3675888"/>
+            <a:ext cx="2468880" cy="365760"/>
+          </a:xfrm>
+          <a:prstGeom prst="rect">
+            <a:avLst/>
+          </a:prstGeom>
+          <a:noFill/>
+        </p:spPr>
+        <p:txBody>
+          <a:bodyPr wrap="square">
+            <a:spAutoFit/>
+          </a:bodyPr>
+          <a:lstStyle/>
+          <a:p>
+            <a:pPr>
+              <a:defRPr sz="1000" b="0">
+                <a:solidFill>
+                  <a:srgbClr val="A6E3A1"/>
+                </a:solidFill>
+              </a:defRPr>
+            </a:pPr>
+            <a:r>
+              <a:t>jt.transform.ImageNormalize</a:t>
+            </a:r>
+          </a:p>
+        </p:txBody>
+      </p:sp>
+      <p:sp>
+        <p:nvSpPr>
+          <p:cNvPr id="35" name="TextBox 34"/>
+          <p:cNvSpPr txBox="1"/>
+          <p:nvPr/>
+        </p:nvSpPr>
+        <p:spPr>
+          <a:xfrm>
+            <a:off x="6858000" y="3675888"/>
+            <a:ext cx="2194560" cy="365760"/>
+          </a:xfrm>
+          <a:prstGeom prst="rect">
+            <a:avLst/>
+          </a:prstGeom>
+          <a:noFill/>
+        </p:spPr>
+        <p:txBody>
+          <a:bodyPr wrap="square">
+            <a:spAutoFit/>
+          </a:bodyPr>
+          <a:lstStyle/>
+          <a:p>
+            <a:pPr>
+              <a:defRPr sz="900" b="0">
+                <a:solidFill>
+                  <a:srgbClr val="6C7086"/>
+                </a:solidFill>
+              </a:defRPr>
+            </a:pPr>
+            <a:r>
+              <a:t>API 名称不同</a:t>
+            </a:r>
+          </a:p>
+        </p:txBody>
+      </p:sp>
+      <p:sp>
+        <p:nvSpPr>
+          <p:cNvPr id="36" name="TextBox 35"/>
+          <p:cNvSpPr txBox="1"/>
+          <p:nvPr/>
+        </p:nvSpPr>
+        <p:spPr>
+          <a:xfrm>
+            <a:off x="182880" y="4059936"/>
+            <a:ext cx="1371600" cy="365760"/>
+          </a:xfrm>
+          <a:prstGeom prst="rect">
+            <a:avLst/>
+          </a:prstGeom>
+          <a:noFill/>
+        </p:spPr>
+        <p:txBody>
+          <a:bodyPr wrap="square">
+            <a:spAutoFit/>
+          </a:bodyPr>
+          <a:lstStyle/>
+          <a:p>
+            <a:pPr>
+              <a:defRPr sz="1000" b="1">
+                <a:solidFill>
+                  <a:srgbClr val="F9E2AF"/>
+                </a:solidFill>
+              </a:defRPr>
+            </a:pPr>
+            <a:r>
+              <a:t>随机种子</a:t>
+            </a:r>
+          </a:p>
+        </p:txBody>
+      </p:sp>
+      <p:sp>
+        <p:nvSpPr>
+          <p:cNvPr id="37" name="TextBox 36"/>
+          <p:cNvSpPr txBox="1"/>
+          <p:nvPr/>
+        </p:nvSpPr>
+        <p:spPr>
+          <a:xfrm>
+            <a:off x="1554480" y="4059936"/>
+            <a:ext cx="2468880" cy="365760"/>
+          </a:xfrm>
+          <a:prstGeom prst="rect">
+            <a:avLst/>
+          </a:prstGeom>
+          <a:noFill/>
+        </p:spPr>
+        <p:txBody>
+          <a:bodyPr wrap="square">
+            <a:spAutoFit/>
+          </a:bodyPr>
+          <a:lstStyle/>
+          <a:p>
+            <a:pPr>
+              <a:defRPr sz="1000" b="0">
+                <a:solidFill>
+                  <a:srgbClr val="F38BA8"/>
+                </a:solidFill>
+              </a:defRPr>
+            </a:pPr>
+            <a:r>
+              <a:t>torch.manual_seed()</a:t>
+            </a:r>
+          </a:p>
+        </p:txBody>
+      </p:sp>
+      <p:sp>
+        <p:nvSpPr>
+          <p:cNvPr id="38" name="TextBox 37"/>
+          <p:cNvSpPr txBox="1"/>
+          <p:nvPr/>
+        </p:nvSpPr>
+        <p:spPr>
+          <a:xfrm>
+            <a:off x="4206240" y="4059936"/>
+            <a:ext cx="2468880" cy="365760"/>
+          </a:xfrm>
+          <a:prstGeom prst="rect">
+            <a:avLst/>
+          </a:prstGeom>
+          <a:noFill/>
+        </p:spPr>
+        <p:txBody>
+          <a:bodyPr wrap="square">
+            <a:spAutoFit/>
+          </a:bodyPr>
+          <a:lstStyle/>
+          <a:p>
+            <a:pPr>
+              <a:defRPr sz="1000" b="0">
+                <a:solidFill>
+                  <a:srgbClr val="A6E3A1"/>
+                </a:solidFill>
+              </a:defRPr>
+            </a:pPr>
+            <a:r>
+              <a:t>jt.set_global_seed()</a:t>
+            </a:r>
+          </a:p>
+        </p:txBody>
+      </p:sp>
+      <p:sp>
+        <p:nvSpPr>
+          <p:cNvPr id="39" name="TextBox 38"/>
+          <p:cNvSpPr txBox="1"/>
+          <p:nvPr/>
+        </p:nvSpPr>
+        <p:spPr>
+          <a:xfrm>
+            <a:off x="6858000" y="4059936"/>
+            <a:ext cx="2194560" cy="365760"/>
+          </a:xfrm>
+          <a:prstGeom prst="rect">
+            <a:avLst/>
+          </a:prstGeom>
+          <a:noFill/>
+        </p:spPr>
+        <p:txBody>
+          <a:bodyPr wrap="square">
+            <a:spAutoFit/>
+          </a:bodyPr>
+          <a:lstStyle/>
+          <a:p>
+            <a:pPr>
+              <a:defRPr sz="900" b="0">
+                <a:solidFill>
+                  <a:srgbClr val="6C7086"/>
+                </a:solidFill>
+              </a:defRPr>
+            </a:pPr>
+            <a:r>
+              <a:t>统一全局随机种子</a:t>
+            </a:r>
+          </a:p>
+        </p:txBody>
+      </p:sp>
+      <p:sp>
+        <p:nvSpPr>
+          <p:cNvPr id="40" name="TextBox 39"/>
+          <p:cNvSpPr txBox="1"/>
+          <p:nvPr/>
+        </p:nvSpPr>
+        <p:spPr>
+          <a:xfrm>
+            <a:off x="182880" y="4443984"/>
+            <a:ext cx="1371600" cy="365760"/>
+          </a:xfrm>
+          <a:prstGeom prst="rect">
+            <a:avLst/>
+          </a:prstGeom>
+          <a:noFill/>
+        </p:spPr>
+        <p:txBody>
+          <a:bodyPr wrap="square">
+            <a:spAutoFit/>
+          </a:bodyPr>
+          <a:lstStyle/>
+          <a:p>
+            <a:pPr>
+              <a:defRPr sz="1000" b="1">
+                <a:solidFill>
+                  <a:srgbClr val="F9E2AF"/>
+                </a:solidFill>
+              </a:defRPr>
+            </a:pPr>
+            <a:r>
+              <a:t>设备管理</a:t>
+            </a:r>
+          </a:p>
+        </p:txBody>
+      </p:sp>
+      <p:sp>
+        <p:nvSpPr>
+          <p:cNvPr id="41" name="TextBox 40"/>
+          <p:cNvSpPr txBox="1"/>
+          <p:nvPr/>
+        </p:nvSpPr>
+        <p:spPr>
+          <a:xfrm>
+            <a:off x="1554480" y="4443984"/>
+            <a:ext cx="2468880" cy="365760"/>
+          </a:xfrm>
+          <a:prstGeom prst="rect">
+            <a:avLst/>
+          </a:prstGeom>
+          <a:noFill/>
+        </p:spPr>
+        <p:txBody>
+          <a:bodyPr wrap="square">
+            <a:spAutoFit/>
+          </a:bodyPr>
+          <a:lstStyle/>
+          <a:p>
+            <a:pPr>
+              <a:defRPr sz="1000" b="0">
+                <a:solidFill>
+                  <a:srgbClr val="F38BA8"/>
+                </a:solidFill>
+              </a:defRPr>
+            </a:pPr>
+            <a:r>
+              <a:t>cuda / mps / cpu</a:t>
+            </a:r>
+          </a:p>
+        </p:txBody>
+      </p:sp>
+      <p:sp>
+        <p:nvSpPr>
+          <p:cNvPr id="42" name="TextBox 41"/>
+          <p:cNvSpPr txBox="1"/>
+          <p:nvPr/>
+        </p:nvSpPr>
+        <p:spPr>
+          <a:xfrm>
+            <a:off x="4206240" y="4443984"/>
+            <a:ext cx="2468880" cy="365760"/>
+          </a:xfrm>
+          <a:prstGeom prst="rect">
+            <a:avLst/>
+          </a:prstGeom>
+          <a:noFill/>
+        </p:spPr>
+        <p:txBody>
+          <a:bodyPr wrap="square">
+            <a:spAutoFit/>
+          </a:bodyPr>
+          <a:lstStyle/>
+          <a:p>
+            <a:pPr>
+              <a:defRPr sz="1000" b="0">
+                <a:solidFill>
+                  <a:srgbClr val="A6E3A1"/>
+                </a:solidFill>
+              </a:defRPr>
+            </a:pPr>
+            <a:r>
+              <a:t>自动管理（仅CPU/CUDA）</a:t>
+            </a:r>
+          </a:p>
+        </p:txBody>
+      </p:sp>
+      <p:sp>
+        <p:nvSpPr>
+          <p:cNvPr id="43" name="TextBox 42"/>
+          <p:cNvSpPr txBox="1"/>
+          <p:nvPr/>
+        </p:nvSpPr>
+        <p:spPr>
+          <a:xfrm>
+            <a:off x="6858000" y="4443984"/>
+            <a:ext cx="2194560" cy="365760"/>
+          </a:xfrm>
+          <a:prstGeom prst="rect">
+            <a:avLst/>
+          </a:prstGeom>
+          <a:noFill/>
+        </p:spPr>
+        <p:txBody>
+          <a:bodyPr wrap="square">
+            <a:spAutoFit/>
+          </a:bodyPr>
+          <a:lstStyle/>
+          <a:p>
+            <a:pPr>
+              <a:defRPr sz="900" b="0">
+                <a:solidFill>
+                  <a:srgbClr val="6C7086"/>
+                </a:solidFill>
+              </a:defRPr>
+            </a:pPr>
+            <a:r>
+              <a:t>不支持 MPS</a:t>
+            </a:r>
+          </a:p>
+        </p:txBody>
+      </p:sp>
+      <p:sp>
+        <p:nvSpPr>
+          <p:cNvPr id="44" name="TextBox 43"/>
+          <p:cNvSpPr txBox="1"/>
+          <p:nvPr/>
+        </p:nvSpPr>
+        <p:spPr>
+          <a:xfrm>
+            <a:off x="182880" y="4828032"/>
+            <a:ext cx="1371600" cy="365760"/>
+          </a:xfrm>
+          <a:prstGeom prst="rect">
+            <a:avLst/>
+          </a:prstGeom>
+          <a:noFill/>
+        </p:spPr>
+        <p:txBody>
+          <a:bodyPr wrap="square">
+            <a:spAutoFit/>
+          </a:bodyPr>
+          <a:lstStyle/>
+          <a:p>
+            <a:pPr>
+              <a:defRPr sz="1000" b="1">
+                <a:solidFill>
+                  <a:srgbClr val="F9E2AF"/>
+                </a:solidFill>
+              </a:defRPr>
+            </a:pPr>
+            <a:r>
+              <a:t>检查点</a:t>
+            </a:r>
+          </a:p>
+        </p:txBody>
+      </p:sp>
+      <p:sp>
+        <p:nvSpPr>
+          <p:cNvPr id="45" name="TextBox 44"/>
+          <p:cNvSpPr txBox="1"/>
+          <p:nvPr/>
+        </p:nvSpPr>
+        <p:spPr>
+          <a:xfrm>
+            <a:off x="1554480" y="4828032"/>
+            <a:ext cx="2468880" cy="365760"/>
+          </a:xfrm>
+          <a:prstGeom prst="rect">
+            <a:avLst/>
+          </a:prstGeom>
+          <a:noFill/>
+        </p:spPr>
+        <p:txBody>
+          <a:bodyPr wrap="square">
+            <a:spAutoFit/>
+          </a:bodyPr>
+          <a:lstStyle/>
+          <a:p>
+            <a:pPr>
+              <a:defRPr sz="1000" b="0">
+                <a:solidFill>
+                  <a:srgbClr val="F38BA8"/>
+                </a:solidFill>
+              </a:defRPr>
+            </a:pPr>
+            <a:r>
+              <a:t>.pth (torch.save)</a:t>
+            </a:r>
+          </a:p>
+        </p:txBody>
+      </p:sp>
+      <p:sp>
+        <p:nvSpPr>
+          <p:cNvPr id="46" name="TextBox 45"/>
+          <p:cNvSpPr txBox="1"/>
+          <p:nvPr/>
+        </p:nvSpPr>
+        <p:spPr>
+          <a:xfrm>
+            <a:off x="4206240" y="4828032"/>
+            <a:ext cx="2468880" cy="365760"/>
+          </a:xfrm>
+          <a:prstGeom prst="rect">
+            <a:avLst/>
+          </a:prstGeom>
+          <a:noFill/>
+        </p:spPr>
+        <p:txBody>
+          <a:bodyPr wrap="square">
+            <a:spAutoFit/>
+          </a:bodyPr>
+          <a:lstStyle/>
+          <a:p>
+            <a:pPr>
+              <a:defRPr sz="1000" b="0">
+                <a:solidFill>
+                  <a:srgbClr val="A6E3A1"/>
+                </a:solidFill>
+              </a:defRPr>
+            </a:pPr>
+            <a:r>
+              <a:t>.pkl + load_pytorch_weights()</a:t>
+            </a:r>
+          </a:p>
+        </p:txBody>
+      </p:sp>
+      <p:sp>
+        <p:nvSpPr>
+          <p:cNvPr id="47" name="TextBox 46"/>
+          <p:cNvSpPr txBox="1"/>
+          <p:nvPr/>
+        </p:nvSpPr>
+        <p:spPr>
+          <a:xfrm>
+            <a:off x="6858000" y="4828032"/>
+            <a:ext cx="2194560" cy="365760"/>
+          </a:xfrm>
+          <a:prstGeom prst="rect">
+            <a:avLst/>
+          </a:prstGeom>
+          <a:noFill/>
+        </p:spPr>
+        <p:txBody>
+          <a:bodyPr wrap="square">
+            <a:spAutoFit/>
+          </a:bodyPr>
+          <a:lstStyle/>
+          <a:p>
+            <a:pPr>
+              <a:defRPr sz="900" b="0">
+                <a:solidFill>
+                  <a:srgbClr val="6C7086"/>
+                </a:solidFill>
+              </a:defRPr>
+            </a:pPr>
+            <a:r>
+              <a:t>可桥接加载 PyTorch 权重</a:t>
             </a:r>
           </a:p>
         </p:txBody>

</xml_diff>